<commit_message>
web scraping slides added
</commit_message>
<xml_diff>
--- a/machine-learning-using-python/Machine Learning with Python.pptx
+++ b/machine-learning-using-python/Machine Learning with Python.pptx
@@ -7,10 +7,18 @@
   <p:sldIdLst>
     <p:sldId id="256" r:id="rId2"/>
     <p:sldId id="257" r:id="rId3"/>
-    <p:sldId id="258" r:id="rId4"/>
-    <p:sldId id="259" r:id="rId5"/>
-    <p:sldId id="260" r:id="rId6"/>
-    <p:sldId id="261" r:id="rId7"/>
+    <p:sldId id="269" r:id="rId4"/>
+    <p:sldId id="263" r:id="rId5"/>
+    <p:sldId id="264" r:id="rId6"/>
+    <p:sldId id="265" r:id="rId7"/>
+    <p:sldId id="266" r:id="rId8"/>
+    <p:sldId id="267" r:id="rId9"/>
+    <p:sldId id="268" r:id="rId10"/>
+    <p:sldId id="258" r:id="rId11"/>
+    <p:sldId id="259" r:id="rId12"/>
+    <p:sldId id="260" r:id="rId13"/>
+    <p:sldId id="261" r:id="rId14"/>
+    <p:sldId id="262" r:id="rId15"/>
   </p:sldIdLst>
   <p:sldSz cx="12192000" cy="6858000"/>
   <p:notesSz cx="6858000" cy="9144000"/>
@@ -264,7 +272,7 @@
           <a:p>
             <a:fld id="{FEE13333-95AC-49D2-AE87-249519AF0812}" type="datetimeFigureOut">
               <a:rPr lang="en-US" smtClean="0"/>
-              <a:t>2/13/2018</a:t>
+              <a:t>2/21/2018</a:t>
             </a:fld>
             <a:endParaRPr lang="en-US"/>
           </a:p>
@@ -462,7 +470,7 @@
           <a:p>
             <a:fld id="{FEE13333-95AC-49D2-AE87-249519AF0812}" type="datetimeFigureOut">
               <a:rPr lang="en-US" smtClean="0"/>
-              <a:t>2/13/2018</a:t>
+              <a:t>2/21/2018</a:t>
             </a:fld>
             <a:endParaRPr lang="en-US"/>
           </a:p>
@@ -670,7 +678,7 @@
           <a:p>
             <a:fld id="{FEE13333-95AC-49D2-AE87-249519AF0812}" type="datetimeFigureOut">
               <a:rPr lang="en-US" smtClean="0"/>
-              <a:t>2/13/2018</a:t>
+              <a:t>2/21/2018</a:t>
             </a:fld>
             <a:endParaRPr lang="en-US"/>
           </a:p>
@@ -868,7 +876,7 @@
           <a:p>
             <a:fld id="{FEE13333-95AC-49D2-AE87-249519AF0812}" type="datetimeFigureOut">
               <a:rPr lang="en-US" smtClean="0"/>
-              <a:t>2/13/2018</a:t>
+              <a:t>2/21/2018</a:t>
             </a:fld>
             <a:endParaRPr lang="en-US"/>
           </a:p>
@@ -1143,7 +1151,7 @@
           <a:p>
             <a:fld id="{FEE13333-95AC-49D2-AE87-249519AF0812}" type="datetimeFigureOut">
               <a:rPr lang="en-US" smtClean="0"/>
-              <a:t>2/13/2018</a:t>
+              <a:t>2/21/2018</a:t>
             </a:fld>
             <a:endParaRPr lang="en-US"/>
           </a:p>
@@ -1408,7 +1416,7 @@
           <a:p>
             <a:fld id="{FEE13333-95AC-49D2-AE87-249519AF0812}" type="datetimeFigureOut">
               <a:rPr lang="en-US" smtClean="0"/>
-              <a:t>2/13/2018</a:t>
+              <a:t>2/21/2018</a:t>
             </a:fld>
             <a:endParaRPr lang="en-US"/>
           </a:p>
@@ -1820,7 +1828,7 @@
           <a:p>
             <a:fld id="{FEE13333-95AC-49D2-AE87-249519AF0812}" type="datetimeFigureOut">
               <a:rPr lang="en-US" smtClean="0"/>
-              <a:t>2/13/2018</a:t>
+              <a:t>2/21/2018</a:t>
             </a:fld>
             <a:endParaRPr lang="en-US"/>
           </a:p>
@@ -1961,7 +1969,7 @@
           <a:p>
             <a:fld id="{FEE13333-95AC-49D2-AE87-249519AF0812}" type="datetimeFigureOut">
               <a:rPr lang="en-US" smtClean="0"/>
-              <a:t>2/13/2018</a:t>
+              <a:t>2/21/2018</a:t>
             </a:fld>
             <a:endParaRPr lang="en-US"/>
           </a:p>
@@ -2074,7 +2082,7 @@
           <a:p>
             <a:fld id="{FEE13333-95AC-49D2-AE87-249519AF0812}" type="datetimeFigureOut">
               <a:rPr lang="en-US" smtClean="0"/>
-              <a:t>2/13/2018</a:t>
+              <a:t>2/21/2018</a:t>
             </a:fld>
             <a:endParaRPr lang="en-US"/>
           </a:p>
@@ -2385,7 +2393,7 @@
           <a:p>
             <a:fld id="{FEE13333-95AC-49D2-AE87-249519AF0812}" type="datetimeFigureOut">
               <a:rPr lang="en-US" smtClean="0"/>
-              <a:t>2/13/2018</a:t>
+              <a:t>2/21/2018</a:t>
             </a:fld>
             <a:endParaRPr lang="en-US"/>
           </a:p>
@@ -2673,7 +2681,7 @@
           <a:p>
             <a:fld id="{FEE13333-95AC-49D2-AE87-249519AF0812}" type="datetimeFigureOut">
               <a:rPr lang="en-US" smtClean="0"/>
-              <a:t>2/13/2018</a:t>
+              <a:t>2/21/2018</a:t>
             </a:fld>
             <a:endParaRPr lang="en-US"/>
           </a:p>
@@ -2914,7 +2922,7 @@
           <a:p>
             <a:fld id="{FEE13333-95AC-49D2-AE87-249519AF0812}" type="datetimeFigureOut">
               <a:rPr lang="en-US" smtClean="0"/>
-              <a:t>2/13/2018</a:t>
+              <a:t>2/21/2018</a:t>
             </a:fld>
             <a:endParaRPr lang="en-US"/>
           </a:p>
@@ -3375,10 +3383,15 @@
             <p:ph type="subTitle" idx="1"/>
           </p:nvPr>
         </p:nvSpPr>
-        <p:spPr/>
+        <p:spPr>
+          <a:xfrm>
+            <a:off x="1524000" y="3602037"/>
+            <a:ext cx="9144000" cy="2335123"/>
+          </a:xfrm>
+        </p:spPr>
         <p:txBody>
           <a:bodyPr>
-            <a:normAutofit lnSpcReduction="10000"/>
+            <a:normAutofit/>
           </a:bodyPr>
           <a:lstStyle/>
           <a:p>
@@ -3396,9 +3409,15 @@
               <a:t>Varun </a:t>
             </a:r>
             <a:r>
-              <a:rPr lang="en-US" dirty="0" err="1"/>
+              <a:rPr lang="en-US" dirty="0" err="1" smtClean="0"/>
               <a:t>Aravinth</a:t>
             </a:r>
+            <a:endParaRPr lang="en-US" dirty="0" smtClean="0"/>
+          </a:p>
+          <a:p>
+            <a:endParaRPr lang="en-US" dirty="0"/>
+          </a:p>
+          <a:p>
             <a:endParaRPr lang="en-US" dirty="0"/>
           </a:p>
         </p:txBody>
@@ -3413,281 +3432,17 @@
   <p:clrMapOvr>
     <a:masterClrMapping/>
   </p:clrMapOvr>
+  <p:timing>
+    <p:tnLst>
+      <p:par>
+        <p:cTn id="1" dur="indefinite" restart="never" nodeType="tmRoot"/>
+      </p:par>
+    </p:tnLst>
+  </p:timing>
 </p:sld>
 </file>
 
-<file path=ppt/slides/slide2.xml><?xml version="1.0" encoding="utf-8"?>
-<p:sld xmlns:a="http://schemas.openxmlformats.org/drawingml/2006/main" xmlns:r="http://schemas.openxmlformats.org/officeDocument/2006/relationships" xmlns:p="http://schemas.openxmlformats.org/presentationml/2006/main">
-  <p:cSld>
-    <p:bg>
-      <p:bgPr>
-        <a:solidFill>
-          <a:schemeClr val="bg1"/>
-        </a:solidFill>
-        <a:effectLst/>
-      </p:bgPr>
-    </p:bg>
-    <p:spTree>
-      <p:nvGrpSpPr>
-        <p:cNvPr id="1" name=""/>
-        <p:cNvGrpSpPr/>
-        <p:nvPr/>
-      </p:nvGrpSpPr>
-      <p:grpSpPr>
-        <a:xfrm>
-          <a:off x="0" y="0"/>
-          <a:ext cx="0" cy="0"/>
-          <a:chOff x="0" y="0"/>
-          <a:chExt cx="0" cy="0"/>
-        </a:xfrm>
-      </p:grpSpPr>
-      <p:sp>
-        <p:nvSpPr>
-          <p:cNvPr id="10" name="Rectangle 9">
-            <a:extLst>
-              <a:ext uri="{FF2B5EF4-FFF2-40B4-BE49-F238E27FC236}">
-                <a16:creationId xmlns:a16="http://schemas.microsoft.com/office/drawing/2014/main" xmlns="" id="{047C8CCB-F95D-4249-92DD-651249D3535A}"/>
-              </a:ext>
-            </a:extLst>
-          </p:cNvPr>
-          <p:cNvSpPr>
-            <a:spLocks noGrp="1" noRot="1" noChangeAspect="1" noMove="1" noResize="1" noEditPoints="1" noAdjustHandles="1" noChangeArrowheads="1" noChangeShapeType="1" noTextEdit="1"/>
-          </p:cNvSpPr>
-          <p:nvPr>
-            <p:extLst>
-              <p:ext uri="{386F3935-93C4-4BCD-93E2-E3B085C9AB24}">
-                <p16:designElem xmlns:p16="http://schemas.microsoft.com/office/powerpoint/2015/main" xmlns="" val="1"/>
-              </p:ext>
-            </p:extLst>
-          </p:nvPr>
-        </p:nvSpPr>
-        <p:spPr>
-          <a:xfrm>
-            <a:off x="0" y="0"/>
-            <a:ext cx="2013557" cy="6858000"/>
-          </a:xfrm>
-          <a:prstGeom prst="rect">
-            <a:avLst/>
-          </a:prstGeom>
-          <a:solidFill>
-            <a:schemeClr val="tx1">
-              <a:lumMod val="50000"/>
-              <a:lumOff val="50000"/>
-            </a:schemeClr>
-          </a:solidFill>
-          <a:ln>
-            <a:noFill/>
-          </a:ln>
-        </p:spPr>
-        <p:style>
-          <a:lnRef idx="2">
-            <a:schemeClr val="accent1">
-              <a:shade val="50000"/>
-            </a:schemeClr>
-          </a:lnRef>
-          <a:fillRef idx="1">
-            <a:schemeClr val="accent1"/>
-          </a:fillRef>
-          <a:effectRef idx="0">
-            <a:schemeClr val="accent1"/>
-          </a:effectRef>
-          <a:fontRef idx="minor">
-            <a:schemeClr val="lt1"/>
-          </a:fontRef>
-        </p:style>
-        <p:txBody>
-          <a:bodyPr rtlCol="0" anchor="ctr"/>
-          <a:lstStyle/>
-          <a:p>
-            <a:pPr algn="ctr"/>
-            <a:endParaRPr lang="en-US"/>
-          </a:p>
-        </p:txBody>
-      </p:sp>
-      <p:pic>
-        <p:nvPicPr>
-          <p:cNvPr id="5" name="Content Placeholder 4">
-            <a:extLst>
-              <a:ext uri="{FF2B5EF4-FFF2-40B4-BE49-F238E27FC236}">
-                <a16:creationId xmlns:a16="http://schemas.microsoft.com/office/drawing/2014/main" xmlns="" id="{C43B10D7-FFCF-4C81-84F6-2E54FC187BBF}"/>
-              </a:ext>
-            </a:extLst>
-          </p:cNvPr>
-          <p:cNvPicPr>
-            <a:picLocks noGrp="1" noChangeAspect="1"/>
-          </p:cNvPicPr>
-          <p:nvPr>
-            <p:ph idx="1"/>
-          </p:nvPr>
-        </p:nvPicPr>
-        <p:blipFill>
-          <a:blip r:embed="rId2">
-            <a:extLst>
-              <a:ext uri="{28A0092B-C50C-407E-A947-70E740481C1C}">
-                <a14:useLocalDpi xmlns:a14="http://schemas.microsoft.com/office/drawing/2010/main" val="0"/>
-              </a:ext>
-            </a:extLst>
-          </a:blip>
-          <a:stretch>
-            <a:fillRect/>
-          </a:stretch>
-        </p:blipFill>
-        <p:spPr>
-          <a:xfrm>
-            <a:off x="4432044" y="166380"/>
-            <a:ext cx="4367524" cy="2183762"/>
-          </a:xfrm>
-          <a:prstGeom prst="rect">
-            <a:avLst/>
-          </a:prstGeom>
-        </p:spPr>
-      </p:pic>
-      <p:sp>
-        <p:nvSpPr>
-          <p:cNvPr id="2" name="Title 1">
-            <a:extLst>
-              <a:ext uri="{FF2B5EF4-FFF2-40B4-BE49-F238E27FC236}">
-                <a16:creationId xmlns:a16="http://schemas.microsoft.com/office/drawing/2014/main" xmlns="" id="{C93F85CD-6066-4732-B0C6-5409B061EB06}"/>
-              </a:ext>
-            </a:extLst>
-          </p:cNvPr>
-          <p:cNvSpPr>
-            <a:spLocks noGrp="1"/>
-          </p:cNvSpPr>
-          <p:nvPr>
-            <p:ph type="title"/>
-          </p:nvPr>
-        </p:nvSpPr>
-        <p:spPr>
-          <a:xfrm>
-            <a:off x="640080" y="2074363"/>
-            <a:ext cx="2752354" cy="2709275"/>
-          </a:xfrm>
-          <a:prstGeom prst="ellipse">
-            <a:avLst/>
-          </a:prstGeom>
-          <a:solidFill>
-            <a:schemeClr val="tx1">
-              <a:lumMod val="85000"/>
-              <a:lumOff val="15000"/>
-            </a:schemeClr>
-          </a:solidFill>
-          <a:ln w="174625" cmpd="thinThick">
-            <a:solidFill>
-              <a:schemeClr val="tx1">
-                <a:lumMod val="85000"/>
-                <a:lumOff val="15000"/>
-              </a:schemeClr>
-            </a:solidFill>
-          </a:ln>
-        </p:spPr>
-        <p:txBody>
-          <a:bodyPr vert="horz" lIns="91440" tIns="45720" rIns="91440" bIns="45720" rtlCol="0" anchor="ctr">
-            <a:normAutofit/>
-          </a:bodyPr>
-          <a:lstStyle/>
-          <a:p>
-            <a:pPr algn="ctr"/>
-            <a:r>
-              <a:rPr lang="en-US" sz="2600" kern="1200">
-                <a:solidFill>
-                  <a:schemeClr val="bg1"/>
-                </a:solidFill>
-                <a:latin typeface="+mj-lt"/>
-                <a:ea typeface="+mj-ea"/>
-                <a:cs typeface="+mj-cs"/>
-              </a:rPr>
-              <a:t>Why Python ?</a:t>
-            </a:r>
-          </a:p>
-        </p:txBody>
-      </p:sp>
-      <p:sp>
-        <p:nvSpPr>
-          <p:cNvPr id="6" name="TextBox 5">
-            <a:extLst>
-              <a:ext uri="{FF2B5EF4-FFF2-40B4-BE49-F238E27FC236}">
-                <a16:creationId xmlns:a16="http://schemas.microsoft.com/office/drawing/2014/main" xmlns="" id="{42FAC7CE-952E-4631-BE69-455441E08E24}"/>
-              </a:ext>
-            </a:extLst>
-          </p:cNvPr>
-          <p:cNvSpPr txBox="1"/>
-          <p:nvPr/>
-        </p:nvSpPr>
-        <p:spPr>
-          <a:xfrm>
-            <a:off x="6096000" y="3459871"/>
-            <a:ext cx="6585995" cy="1754326"/>
-          </a:xfrm>
-          <a:prstGeom prst="rect">
-            <a:avLst/>
-          </a:prstGeom>
-          <a:noFill/>
-        </p:spPr>
-        <p:txBody>
-          <a:bodyPr wrap="square" rtlCol="0">
-            <a:spAutoFit/>
-          </a:bodyPr>
-          <a:lstStyle/>
-          <a:p>
-            <a:pPr marL="285750" indent="-285750">
-              <a:buFont typeface="Arial" panose="020B0604020202020204" pitchFamily="34" charset="0"/>
-              <a:buChar char="•"/>
-            </a:pPr>
-            <a:r>
-              <a:rPr lang="en-US" dirty="0"/>
-              <a:t>Easy Syntax</a:t>
-            </a:r>
-          </a:p>
-          <a:p>
-            <a:endParaRPr lang="en-US" dirty="0"/>
-          </a:p>
-          <a:p>
-            <a:pPr marL="285750" indent="-285750">
-              <a:buFont typeface="Arial" panose="020B0604020202020204" pitchFamily="34" charset="0"/>
-              <a:buChar char="•"/>
-            </a:pPr>
-            <a:r>
-              <a:rPr lang="en-US" dirty="0"/>
-              <a:t>Modules : Do anything</a:t>
-            </a:r>
-          </a:p>
-          <a:p>
-            <a:pPr marL="285750" indent="-285750">
-              <a:buFont typeface="Arial" panose="020B0604020202020204" pitchFamily="34" charset="0"/>
-              <a:buChar char="•"/>
-            </a:pPr>
-            <a:endParaRPr lang="en-US" dirty="0"/>
-          </a:p>
-          <a:p>
-            <a:pPr marL="285750" indent="-285750">
-              <a:buFont typeface="Arial" panose="020B0604020202020204" pitchFamily="34" charset="0"/>
-              <a:buChar char="•"/>
-            </a:pPr>
-            <a:r>
-              <a:rPr lang="en-US" dirty="0"/>
-              <a:t>And it gives you wings</a:t>
-            </a:r>
-          </a:p>
-          <a:p>
-            <a:endParaRPr lang="en-US" dirty="0"/>
-          </a:p>
-        </p:txBody>
-      </p:sp>
-    </p:spTree>
-    <p:extLst>
-      <p:ext uri="{BB962C8B-B14F-4D97-AF65-F5344CB8AC3E}">
-        <p14:creationId xmlns:p14="http://schemas.microsoft.com/office/powerpoint/2010/main" val="179063133"/>
-      </p:ext>
-    </p:extLst>
-  </p:cSld>
-  <p:clrMapOvr>
-    <a:masterClrMapping/>
-  </p:clrMapOvr>
-</p:sld>
-</file>
-
-<file path=ppt/slides/slide3.xml><?xml version="1.0" encoding="utf-8"?>
+<file path=ppt/slides/slide10.xml><?xml version="1.0" encoding="utf-8"?>
 <p:sld xmlns:a="http://schemas.openxmlformats.org/drawingml/2006/main" xmlns:r="http://schemas.openxmlformats.org/officeDocument/2006/relationships" xmlns:p="http://schemas.openxmlformats.org/presentationml/2006/main">
   <p:cSld>
     <p:bg>
@@ -4165,7 +3920,7 @@
 </p:sld>
 </file>
 
-<file path=ppt/slides/slide4.xml><?xml version="1.0" encoding="utf-8"?>
+<file path=ppt/slides/slide11.xml><?xml version="1.0" encoding="utf-8"?>
 <p:sld xmlns:a="http://schemas.openxmlformats.org/drawingml/2006/main" xmlns:r="http://schemas.openxmlformats.org/officeDocument/2006/relationships" xmlns:p="http://schemas.openxmlformats.org/presentationml/2006/main">
   <p:cSld>
     <p:bg>
@@ -4470,7 +4225,7 @@
 </p:sld>
 </file>
 
-<file path=ppt/slides/slide5.xml><?xml version="1.0" encoding="utf-8"?>
+<file path=ppt/slides/slide12.xml><?xml version="1.0" encoding="utf-8"?>
 <p:sld xmlns:a="http://schemas.openxmlformats.org/drawingml/2006/main" xmlns:r="http://schemas.openxmlformats.org/officeDocument/2006/relationships" xmlns:p="http://schemas.openxmlformats.org/presentationml/2006/main">
   <p:cSld>
     <p:bg>
@@ -4725,6 +4480,853 @@
 </p:sld>
 </file>
 
+<file path=ppt/slides/slide13.xml><?xml version="1.0" encoding="utf-8"?>
+<p:sld xmlns:a="http://schemas.openxmlformats.org/drawingml/2006/main" xmlns:r="http://schemas.openxmlformats.org/officeDocument/2006/relationships" xmlns:p="http://schemas.openxmlformats.org/presentationml/2006/main">
+  <p:cSld>
+    <p:spTree>
+      <p:nvGrpSpPr>
+        <p:cNvPr id="1" name=""/>
+        <p:cNvGrpSpPr/>
+        <p:nvPr/>
+      </p:nvGrpSpPr>
+      <p:grpSpPr>
+        <a:xfrm>
+          <a:off x="0" y="0"/>
+          <a:ext cx="0" cy="0"/>
+          <a:chOff x="0" y="0"/>
+          <a:chExt cx="0" cy="0"/>
+        </a:xfrm>
+      </p:grpSpPr>
+      <p:sp>
+        <p:nvSpPr>
+          <p:cNvPr id="2" name="Title 1"/>
+          <p:cNvSpPr>
+            <a:spLocks noGrp="1"/>
+          </p:cNvSpPr>
+          <p:nvPr>
+            <p:ph type="title"/>
+          </p:nvPr>
+        </p:nvSpPr>
+        <p:spPr/>
+        <p:txBody>
+          <a:bodyPr/>
+          <a:lstStyle/>
+          <a:p>
+            <a:r>
+              <a:rPr lang="en-IN" dirty="0" smtClean="0"/>
+              <a:t>               Data Science - Introduction</a:t>
+            </a:r>
+            <a:endParaRPr lang="en-IN" dirty="0"/>
+          </a:p>
+        </p:txBody>
+      </p:sp>
+      <p:sp>
+        <p:nvSpPr>
+          <p:cNvPr id="3" name="Content Placeholder 2"/>
+          <p:cNvSpPr>
+            <a:spLocks noGrp="1"/>
+          </p:cNvSpPr>
+          <p:nvPr>
+            <p:ph idx="1"/>
+          </p:nvPr>
+        </p:nvSpPr>
+        <p:spPr>
+          <a:xfrm>
+            <a:off x="838200" y="1825625"/>
+            <a:ext cx="10515600" cy="4351338"/>
+          </a:xfrm>
+        </p:spPr>
+        <p:txBody>
+          <a:bodyPr>
+            <a:normAutofit fontScale="92500" lnSpcReduction="10000"/>
+          </a:bodyPr>
+          <a:lstStyle/>
+          <a:p>
+            <a:r>
+              <a:rPr lang="en-IN" dirty="0" smtClean="0"/>
+              <a:t>NumPy – Numeric Python</a:t>
+            </a:r>
+          </a:p>
+          <a:p>
+            <a:pPr marL="0" indent="0">
+              <a:buNone/>
+            </a:pPr>
+            <a:r>
+              <a:rPr lang="en-IN" sz="1800" dirty="0" smtClean="0"/>
+              <a:t>	NumPy </a:t>
+            </a:r>
+            <a:r>
+              <a:rPr lang="en-IN" sz="1800" dirty="0"/>
+              <a:t>is a Python package. It stands for 'Numerical Python'. It is a library consisting of multidimensional </a:t>
+            </a:r>
+            <a:r>
+              <a:rPr lang="en-IN" sz="1800" dirty="0" smtClean="0"/>
+              <a:t>	array objects </a:t>
+            </a:r>
+            <a:r>
+              <a:rPr lang="en-IN" sz="1800" dirty="0"/>
+              <a:t>and a collection of routines for processing of array</a:t>
+            </a:r>
+            <a:r>
+              <a:rPr lang="en-IN" sz="1800" dirty="0" smtClean="0"/>
+              <a:t>.</a:t>
+            </a:r>
+          </a:p>
+          <a:p>
+            <a:pPr marL="0" indent="0">
+              <a:buNone/>
+            </a:pPr>
+            <a:r>
+              <a:rPr lang="en-IN" sz="1800" dirty="0" smtClean="0"/>
+              <a:t>	Numeric + Numarray</a:t>
+            </a:r>
+          </a:p>
+          <a:p>
+            <a:pPr marL="0" indent="0">
+              <a:buNone/>
+            </a:pPr>
+            <a:endParaRPr lang="en-IN" sz="1800" dirty="0" smtClean="0"/>
+          </a:p>
+          <a:p>
+            <a:endParaRPr lang="en-IN" dirty="0"/>
+          </a:p>
+          <a:p>
+            <a:r>
+              <a:rPr lang="en-IN" dirty="0" smtClean="0"/>
+              <a:t>Why NumPy when you have lists ?</a:t>
+            </a:r>
+          </a:p>
+          <a:p>
+            <a:endParaRPr lang="en-IN" dirty="0"/>
+          </a:p>
+          <a:p>
+            <a:r>
+              <a:rPr lang="en-IN" dirty="0" smtClean="0"/>
+              <a:t>Detail Analysis</a:t>
+            </a:r>
+          </a:p>
+          <a:p>
+            <a:endParaRPr lang="en-IN" dirty="0"/>
+          </a:p>
+          <a:p>
+            <a:r>
+              <a:rPr lang="en-IN" dirty="0" smtClean="0"/>
+              <a:t>Datasets for NumPy</a:t>
+            </a:r>
+            <a:endParaRPr lang="en-IN" dirty="0"/>
+          </a:p>
+        </p:txBody>
+      </p:sp>
+    </p:spTree>
+    <p:extLst>
+      <p:ext uri="{BB962C8B-B14F-4D97-AF65-F5344CB8AC3E}">
+        <p14:creationId xmlns:p14="http://schemas.microsoft.com/office/powerpoint/2010/main" val="1847141217"/>
+      </p:ext>
+    </p:extLst>
+  </p:cSld>
+  <p:clrMapOvr>
+    <a:masterClrMapping/>
+  </p:clrMapOvr>
+</p:sld>
+</file>
+
+<file path=ppt/slides/slide14.xml><?xml version="1.0" encoding="utf-8"?>
+<p:sld xmlns:a="http://schemas.openxmlformats.org/drawingml/2006/main" xmlns:r="http://schemas.openxmlformats.org/officeDocument/2006/relationships" xmlns:p="http://schemas.openxmlformats.org/presentationml/2006/main">
+  <p:cSld>
+    <p:spTree>
+      <p:nvGrpSpPr>
+        <p:cNvPr id="1" name=""/>
+        <p:cNvGrpSpPr/>
+        <p:nvPr/>
+      </p:nvGrpSpPr>
+      <p:grpSpPr>
+        <a:xfrm>
+          <a:off x="0" y="0"/>
+          <a:ext cx="0" cy="0"/>
+          <a:chOff x="0" y="0"/>
+          <a:chExt cx="0" cy="0"/>
+        </a:xfrm>
+      </p:grpSpPr>
+      <p:pic>
+        <p:nvPicPr>
+          <p:cNvPr id="6" name="Content Placeholder 3"/>
+          <p:cNvPicPr>
+            <a:picLocks noGrp="1" noChangeAspect="1"/>
+          </p:cNvPicPr>
+          <p:nvPr>
+            <p:ph idx="1"/>
+          </p:nvPr>
+        </p:nvPicPr>
+        <p:blipFill>
+          <a:blip r:embed="rId2">
+            <a:extLst>
+              <a:ext uri="{28A0092B-C50C-407E-A947-70E740481C1C}">
+                <a14:useLocalDpi xmlns:a14="http://schemas.microsoft.com/office/drawing/2010/main" val="0"/>
+              </a:ext>
+            </a:extLst>
+          </a:blip>
+          <a:stretch>
+            <a:fillRect/>
+          </a:stretch>
+        </p:blipFill>
+        <p:spPr>
+          <a:xfrm>
+            <a:off x="542791" y="1300766"/>
+            <a:ext cx="3861784" cy="1377492"/>
+          </a:xfrm>
+          <a:prstGeom prst="rect">
+            <a:avLst/>
+          </a:prstGeom>
+        </p:spPr>
+      </p:pic>
+      <p:sp>
+        <p:nvSpPr>
+          <p:cNvPr id="9" name="TextBox 8"/>
+          <p:cNvSpPr txBox="1"/>
+          <p:nvPr/>
+        </p:nvSpPr>
+        <p:spPr>
+          <a:xfrm>
+            <a:off x="5306096" y="1804846"/>
+            <a:ext cx="5692462" cy="523220"/>
+          </a:xfrm>
+          <a:prstGeom prst="rect">
+            <a:avLst/>
+          </a:prstGeom>
+          <a:noFill/>
+        </p:spPr>
+        <p:txBody>
+          <a:bodyPr wrap="square" rtlCol="0">
+            <a:spAutoFit/>
+          </a:bodyPr>
+          <a:lstStyle/>
+          <a:p>
+            <a:r>
+              <a:rPr lang="en-IN" sz="2800" b="1" dirty="0"/>
+              <a:t>https://github.com/VarunAravinth</a:t>
+            </a:r>
+          </a:p>
+        </p:txBody>
+      </p:sp>
+      <p:sp>
+        <p:nvSpPr>
+          <p:cNvPr id="11" name="Rectangle 10"/>
+          <p:cNvSpPr/>
+          <p:nvPr/>
+        </p:nvSpPr>
+        <p:spPr>
+          <a:xfrm>
+            <a:off x="4182502" y="3819255"/>
+            <a:ext cx="2590324" cy="769441"/>
+          </a:xfrm>
+          <a:prstGeom prst="rect">
+            <a:avLst/>
+          </a:prstGeom>
+        </p:spPr>
+        <p:txBody>
+          <a:bodyPr wrap="none">
+            <a:spAutoFit/>
+          </a:bodyPr>
+          <a:lstStyle/>
+          <a:p>
+            <a:r>
+              <a:rPr lang="en-IN" dirty="0"/>
+              <a:t> </a:t>
+            </a:r>
+            <a:r>
+              <a:rPr lang="en-IN" sz="4400" dirty="0" smtClean="0"/>
+              <a:t>Thank You</a:t>
+            </a:r>
+            <a:endParaRPr lang="en-IN" dirty="0"/>
+          </a:p>
+        </p:txBody>
+      </p:sp>
+    </p:spTree>
+    <p:extLst>
+      <p:ext uri="{BB962C8B-B14F-4D97-AF65-F5344CB8AC3E}">
+        <p14:creationId xmlns:p14="http://schemas.microsoft.com/office/powerpoint/2010/main" val="754636116"/>
+      </p:ext>
+    </p:extLst>
+  </p:cSld>
+  <p:clrMapOvr>
+    <a:masterClrMapping/>
+  </p:clrMapOvr>
+</p:sld>
+</file>
+
+<file path=ppt/slides/slide2.xml><?xml version="1.0" encoding="utf-8"?>
+<p:sld xmlns:a="http://schemas.openxmlformats.org/drawingml/2006/main" xmlns:r="http://schemas.openxmlformats.org/officeDocument/2006/relationships" xmlns:p="http://schemas.openxmlformats.org/presentationml/2006/main">
+  <p:cSld>
+    <p:bg>
+      <p:bgPr>
+        <a:solidFill>
+          <a:schemeClr val="bg1"/>
+        </a:solidFill>
+        <a:effectLst/>
+      </p:bgPr>
+    </p:bg>
+    <p:spTree>
+      <p:nvGrpSpPr>
+        <p:cNvPr id="1" name=""/>
+        <p:cNvGrpSpPr/>
+        <p:nvPr/>
+      </p:nvGrpSpPr>
+      <p:grpSpPr>
+        <a:xfrm>
+          <a:off x="0" y="0"/>
+          <a:ext cx="0" cy="0"/>
+          <a:chOff x="0" y="0"/>
+          <a:chExt cx="0" cy="0"/>
+        </a:xfrm>
+      </p:grpSpPr>
+      <p:sp>
+        <p:nvSpPr>
+          <p:cNvPr id="10" name="Rectangle 9">
+            <a:extLst>
+              <a:ext uri="{FF2B5EF4-FFF2-40B4-BE49-F238E27FC236}">
+                <a16:creationId xmlns:a16="http://schemas.microsoft.com/office/drawing/2014/main" xmlns="" id="{047C8CCB-F95D-4249-92DD-651249D3535A}"/>
+              </a:ext>
+            </a:extLst>
+          </p:cNvPr>
+          <p:cNvSpPr>
+            <a:spLocks noGrp="1" noRot="1" noChangeAspect="1" noMove="1" noResize="1" noEditPoints="1" noAdjustHandles="1" noChangeArrowheads="1" noChangeShapeType="1" noTextEdit="1"/>
+          </p:cNvSpPr>
+          <p:nvPr>
+            <p:extLst>
+              <p:ext uri="{386F3935-93C4-4BCD-93E2-E3B085C9AB24}">
+                <p16:designElem xmlns:p16="http://schemas.microsoft.com/office/powerpoint/2015/main" xmlns="" val="1"/>
+              </p:ext>
+            </p:extLst>
+          </p:nvPr>
+        </p:nvSpPr>
+        <p:spPr>
+          <a:xfrm>
+            <a:off x="0" y="0"/>
+            <a:ext cx="2013557" cy="6858000"/>
+          </a:xfrm>
+          <a:prstGeom prst="rect">
+            <a:avLst/>
+          </a:prstGeom>
+          <a:solidFill>
+            <a:schemeClr val="tx1">
+              <a:lumMod val="50000"/>
+              <a:lumOff val="50000"/>
+            </a:schemeClr>
+          </a:solidFill>
+          <a:ln>
+            <a:noFill/>
+          </a:ln>
+        </p:spPr>
+        <p:style>
+          <a:lnRef idx="2">
+            <a:schemeClr val="accent1">
+              <a:shade val="50000"/>
+            </a:schemeClr>
+          </a:lnRef>
+          <a:fillRef idx="1">
+            <a:schemeClr val="accent1"/>
+          </a:fillRef>
+          <a:effectRef idx="0">
+            <a:schemeClr val="accent1"/>
+          </a:effectRef>
+          <a:fontRef idx="minor">
+            <a:schemeClr val="lt1"/>
+          </a:fontRef>
+        </p:style>
+        <p:txBody>
+          <a:bodyPr rtlCol="0" anchor="ctr"/>
+          <a:lstStyle/>
+          <a:p>
+            <a:pPr algn="ctr"/>
+            <a:endParaRPr lang="en-US"/>
+          </a:p>
+        </p:txBody>
+      </p:sp>
+      <p:pic>
+        <p:nvPicPr>
+          <p:cNvPr id="5" name="Content Placeholder 4">
+            <a:extLst>
+              <a:ext uri="{FF2B5EF4-FFF2-40B4-BE49-F238E27FC236}">
+                <a16:creationId xmlns:a16="http://schemas.microsoft.com/office/drawing/2014/main" xmlns="" id="{C43B10D7-FFCF-4C81-84F6-2E54FC187BBF}"/>
+              </a:ext>
+            </a:extLst>
+          </p:cNvPr>
+          <p:cNvPicPr>
+            <a:picLocks noGrp="1" noChangeAspect="1"/>
+          </p:cNvPicPr>
+          <p:nvPr>
+            <p:ph idx="1"/>
+          </p:nvPr>
+        </p:nvPicPr>
+        <p:blipFill>
+          <a:blip r:embed="rId2">
+            <a:extLst>
+              <a:ext uri="{28A0092B-C50C-407E-A947-70E740481C1C}">
+                <a14:useLocalDpi xmlns:a14="http://schemas.microsoft.com/office/drawing/2010/main" val="0"/>
+              </a:ext>
+            </a:extLst>
+          </a:blip>
+          <a:stretch>
+            <a:fillRect/>
+          </a:stretch>
+        </p:blipFill>
+        <p:spPr>
+          <a:xfrm>
+            <a:off x="4432044" y="166380"/>
+            <a:ext cx="4367524" cy="2183762"/>
+          </a:xfrm>
+          <a:prstGeom prst="rect">
+            <a:avLst/>
+          </a:prstGeom>
+        </p:spPr>
+      </p:pic>
+      <p:sp>
+        <p:nvSpPr>
+          <p:cNvPr id="2" name="Title 1">
+            <a:extLst>
+              <a:ext uri="{FF2B5EF4-FFF2-40B4-BE49-F238E27FC236}">
+                <a16:creationId xmlns:a16="http://schemas.microsoft.com/office/drawing/2014/main" xmlns="" id="{C93F85CD-6066-4732-B0C6-5409B061EB06}"/>
+              </a:ext>
+            </a:extLst>
+          </p:cNvPr>
+          <p:cNvSpPr>
+            <a:spLocks noGrp="1"/>
+          </p:cNvSpPr>
+          <p:nvPr>
+            <p:ph type="title"/>
+          </p:nvPr>
+        </p:nvSpPr>
+        <p:spPr>
+          <a:xfrm>
+            <a:off x="640080" y="2074363"/>
+            <a:ext cx="2752354" cy="2709275"/>
+          </a:xfrm>
+          <a:prstGeom prst="ellipse">
+            <a:avLst/>
+          </a:prstGeom>
+          <a:solidFill>
+            <a:schemeClr val="tx1">
+              <a:lumMod val="85000"/>
+              <a:lumOff val="15000"/>
+            </a:schemeClr>
+          </a:solidFill>
+          <a:ln w="174625" cmpd="thinThick">
+            <a:solidFill>
+              <a:schemeClr val="tx1">
+                <a:lumMod val="85000"/>
+                <a:lumOff val="15000"/>
+              </a:schemeClr>
+            </a:solidFill>
+          </a:ln>
+        </p:spPr>
+        <p:txBody>
+          <a:bodyPr vert="horz" lIns="91440" tIns="45720" rIns="91440" bIns="45720" rtlCol="0" anchor="ctr">
+            <a:normAutofit/>
+          </a:bodyPr>
+          <a:lstStyle/>
+          <a:p>
+            <a:pPr algn="ctr"/>
+            <a:r>
+              <a:rPr lang="en-US" sz="2600" kern="1200">
+                <a:solidFill>
+                  <a:schemeClr val="bg1"/>
+                </a:solidFill>
+                <a:latin typeface="+mj-lt"/>
+                <a:ea typeface="+mj-ea"/>
+                <a:cs typeface="+mj-cs"/>
+              </a:rPr>
+              <a:t>Why Python ?</a:t>
+            </a:r>
+          </a:p>
+        </p:txBody>
+      </p:sp>
+      <p:sp>
+        <p:nvSpPr>
+          <p:cNvPr id="6" name="TextBox 5">
+            <a:extLst>
+              <a:ext uri="{FF2B5EF4-FFF2-40B4-BE49-F238E27FC236}">
+                <a16:creationId xmlns:a16="http://schemas.microsoft.com/office/drawing/2014/main" xmlns="" id="{42FAC7CE-952E-4631-BE69-455441E08E24}"/>
+              </a:ext>
+            </a:extLst>
+          </p:cNvPr>
+          <p:cNvSpPr txBox="1"/>
+          <p:nvPr/>
+        </p:nvSpPr>
+        <p:spPr>
+          <a:xfrm>
+            <a:off x="6096000" y="3459871"/>
+            <a:ext cx="6585995" cy="1754326"/>
+          </a:xfrm>
+          <a:prstGeom prst="rect">
+            <a:avLst/>
+          </a:prstGeom>
+          <a:noFill/>
+        </p:spPr>
+        <p:txBody>
+          <a:bodyPr wrap="square" rtlCol="0">
+            <a:spAutoFit/>
+          </a:bodyPr>
+          <a:lstStyle/>
+          <a:p>
+            <a:pPr marL="285750" indent="-285750">
+              <a:buFont typeface="Arial" panose="020B0604020202020204" pitchFamily="34" charset="0"/>
+              <a:buChar char="•"/>
+            </a:pPr>
+            <a:r>
+              <a:rPr lang="en-US" dirty="0"/>
+              <a:t>Easy Syntax</a:t>
+            </a:r>
+          </a:p>
+          <a:p>
+            <a:endParaRPr lang="en-US" dirty="0"/>
+          </a:p>
+          <a:p>
+            <a:pPr marL="285750" indent="-285750">
+              <a:buFont typeface="Arial" panose="020B0604020202020204" pitchFamily="34" charset="0"/>
+              <a:buChar char="•"/>
+            </a:pPr>
+            <a:r>
+              <a:rPr lang="en-US" dirty="0"/>
+              <a:t>Modules : Do anything</a:t>
+            </a:r>
+          </a:p>
+          <a:p>
+            <a:pPr marL="285750" indent="-285750">
+              <a:buFont typeface="Arial" panose="020B0604020202020204" pitchFamily="34" charset="0"/>
+              <a:buChar char="•"/>
+            </a:pPr>
+            <a:endParaRPr lang="en-US" dirty="0"/>
+          </a:p>
+          <a:p>
+            <a:pPr marL="285750" indent="-285750">
+              <a:buFont typeface="Arial" panose="020B0604020202020204" pitchFamily="34" charset="0"/>
+              <a:buChar char="•"/>
+            </a:pPr>
+            <a:r>
+              <a:rPr lang="en-US" dirty="0"/>
+              <a:t>And it gives you wings</a:t>
+            </a:r>
+          </a:p>
+          <a:p>
+            <a:endParaRPr lang="en-US" dirty="0"/>
+          </a:p>
+        </p:txBody>
+      </p:sp>
+    </p:spTree>
+    <p:extLst>
+      <p:ext uri="{BB962C8B-B14F-4D97-AF65-F5344CB8AC3E}">
+        <p14:creationId xmlns:p14="http://schemas.microsoft.com/office/powerpoint/2010/main" val="179063133"/>
+      </p:ext>
+    </p:extLst>
+  </p:cSld>
+  <p:clrMapOvr>
+    <a:masterClrMapping/>
+  </p:clrMapOvr>
+  <p:timing>
+    <p:tnLst>
+      <p:par>
+        <p:cTn id="1" dur="indefinite" restart="never" nodeType="tmRoot"/>
+      </p:par>
+    </p:tnLst>
+  </p:timing>
+</p:sld>
+</file>
+
+<file path=ppt/slides/slide3.xml><?xml version="1.0" encoding="utf-8"?>
+<p:sld xmlns:a="http://schemas.openxmlformats.org/drawingml/2006/main" xmlns:r="http://schemas.openxmlformats.org/officeDocument/2006/relationships" xmlns:p="http://schemas.openxmlformats.org/presentationml/2006/main">
+  <p:cSld>
+    <p:spTree>
+      <p:nvGrpSpPr>
+        <p:cNvPr id="1" name=""/>
+        <p:cNvGrpSpPr/>
+        <p:nvPr/>
+      </p:nvGrpSpPr>
+      <p:grpSpPr>
+        <a:xfrm>
+          <a:off x="0" y="0"/>
+          <a:ext cx="0" cy="0"/>
+          <a:chOff x="0" y="0"/>
+          <a:chExt cx="0" cy="0"/>
+        </a:xfrm>
+      </p:grpSpPr>
+      <p:sp>
+        <p:nvSpPr>
+          <p:cNvPr id="2" name="Title 1"/>
+          <p:cNvSpPr>
+            <a:spLocks noGrp="1"/>
+          </p:cNvSpPr>
+          <p:nvPr>
+            <p:ph type="title"/>
+          </p:nvPr>
+        </p:nvSpPr>
+        <p:spPr>
+          <a:xfrm>
+            <a:off x="1700011" y="365126"/>
+            <a:ext cx="7688688" cy="768216"/>
+          </a:xfrm>
+        </p:spPr>
+        <p:txBody>
+          <a:bodyPr/>
+          <a:lstStyle/>
+          <a:p>
+            <a:r>
+              <a:rPr lang="en-IN" dirty="0" smtClean="0"/>
+              <a:t>             Market Demand 2015</a:t>
+            </a:r>
+            <a:endParaRPr lang="en-IN" dirty="0"/>
+          </a:p>
+        </p:txBody>
+      </p:sp>
+      <p:pic>
+        <p:nvPicPr>
+          <p:cNvPr id="4" name="Content Placeholder 3"/>
+          <p:cNvPicPr>
+            <a:picLocks noGrp="1" noChangeAspect="1"/>
+          </p:cNvPicPr>
+          <p:nvPr>
+            <p:ph idx="1"/>
+          </p:nvPr>
+        </p:nvPicPr>
+        <p:blipFill>
+          <a:blip r:embed="rId2">
+            <a:extLst>
+              <a:ext uri="{28A0092B-C50C-407E-A947-70E740481C1C}">
+                <a14:useLocalDpi xmlns:a14="http://schemas.microsoft.com/office/drawing/2010/main" val="0"/>
+              </a:ext>
+            </a:extLst>
+          </a:blip>
+          <a:stretch>
+            <a:fillRect/>
+          </a:stretch>
+        </p:blipFill>
+        <p:spPr>
+          <a:xfrm>
+            <a:off x="2511379" y="1690688"/>
+            <a:ext cx="6529589" cy="4980568"/>
+          </a:xfrm>
+        </p:spPr>
+      </p:pic>
+    </p:spTree>
+    <p:extLst>
+      <p:ext uri="{BB962C8B-B14F-4D97-AF65-F5344CB8AC3E}">
+        <p14:creationId xmlns:p14="http://schemas.microsoft.com/office/powerpoint/2010/main" val="2045930997"/>
+      </p:ext>
+    </p:extLst>
+  </p:cSld>
+  <p:clrMapOvr>
+    <a:masterClrMapping/>
+  </p:clrMapOvr>
+</p:sld>
+</file>
+
+<file path=ppt/slides/slide4.xml><?xml version="1.0" encoding="utf-8"?>
+<p:sld xmlns:a="http://schemas.openxmlformats.org/drawingml/2006/main" xmlns:r="http://schemas.openxmlformats.org/officeDocument/2006/relationships" xmlns:p="http://schemas.openxmlformats.org/presentationml/2006/main">
+  <p:cSld>
+    <p:spTree>
+      <p:nvGrpSpPr>
+        <p:cNvPr id="1" name=""/>
+        <p:cNvGrpSpPr/>
+        <p:nvPr/>
+      </p:nvGrpSpPr>
+      <p:grpSpPr>
+        <a:xfrm>
+          <a:off x="0" y="0"/>
+          <a:ext cx="0" cy="0"/>
+          <a:chOff x="0" y="0"/>
+          <a:chExt cx="0" cy="0"/>
+        </a:xfrm>
+      </p:grpSpPr>
+      <p:sp>
+        <p:nvSpPr>
+          <p:cNvPr id="2" name="Title 1"/>
+          <p:cNvSpPr>
+            <a:spLocks noGrp="1"/>
+          </p:cNvSpPr>
+          <p:nvPr>
+            <p:ph type="ctrTitle"/>
+          </p:nvPr>
+        </p:nvSpPr>
+        <p:spPr/>
+        <p:txBody>
+          <a:bodyPr/>
+          <a:lstStyle/>
+          <a:p>
+            <a:r>
+              <a:rPr lang="en-IN" dirty="0" smtClean="0"/>
+              <a:t>Web Scraping</a:t>
+            </a:r>
+            <a:endParaRPr lang="en-IN" dirty="0"/>
+          </a:p>
+        </p:txBody>
+      </p:sp>
+      <p:sp>
+        <p:nvSpPr>
+          <p:cNvPr id="3" name="Subtitle 2"/>
+          <p:cNvSpPr>
+            <a:spLocks noGrp="1"/>
+          </p:cNvSpPr>
+          <p:nvPr>
+            <p:ph type="subTitle" idx="1"/>
+          </p:nvPr>
+        </p:nvSpPr>
+        <p:spPr/>
+        <p:txBody>
+          <a:bodyPr>
+            <a:normAutofit/>
+          </a:bodyPr>
+          <a:lstStyle/>
+          <a:p>
+            <a:endParaRPr lang="en-IN" dirty="0" smtClean="0"/>
+          </a:p>
+          <a:p>
+            <a:endParaRPr lang="en-IN" dirty="0"/>
+          </a:p>
+          <a:p>
+            <a:endParaRPr lang="en-IN" dirty="0"/>
+          </a:p>
+        </p:txBody>
+      </p:sp>
+    </p:spTree>
+    <p:extLst>
+      <p:ext uri="{BB962C8B-B14F-4D97-AF65-F5344CB8AC3E}">
+        <p14:creationId xmlns:p14="http://schemas.microsoft.com/office/powerpoint/2010/main" val="2199872774"/>
+      </p:ext>
+    </p:extLst>
+  </p:cSld>
+  <p:clrMapOvr>
+    <a:masterClrMapping/>
+  </p:clrMapOvr>
+</p:sld>
+</file>
+
+<file path=ppt/slides/slide5.xml><?xml version="1.0" encoding="utf-8"?>
+<p:sld xmlns:a="http://schemas.openxmlformats.org/drawingml/2006/main" xmlns:r="http://schemas.openxmlformats.org/officeDocument/2006/relationships" xmlns:p="http://schemas.openxmlformats.org/presentationml/2006/main">
+  <p:cSld>
+    <p:spTree>
+      <p:nvGrpSpPr>
+        <p:cNvPr id="1" name=""/>
+        <p:cNvGrpSpPr/>
+        <p:nvPr/>
+      </p:nvGrpSpPr>
+      <p:grpSpPr>
+        <a:xfrm>
+          <a:off x="0" y="0"/>
+          <a:ext cx="0" cy="0"/>
+          <a:chOff x="0" y="0"/>
+          <a:chExt cx="0" cy="0"/>
+        </a:xfrm>
+      </p:grpSpPr>
+      <p:sp>
+        <p:nvSpPr>
+          <p:cNvPr id="2" name="Title 1"/>
+          <p:cNvSpPr>
+            <a:spLocks noGrp="1"/>
+          </p:cNvSpPr>
+          <p:nvPr>
+            <p:ph type="title"/>
+          </p:nvPr>
+        </p:nvSpPr>
+        <p:spPr/>
+        <p:txBody>
+          <a:bodyPr/>
+          <a:lstStyle/>
+          <a:p>
+            <a:r>
+              <a:rPr lang="en-IN" dirty="0" smtClean="0"/>
+              <a:t>Why Scraping ?</a:t>
+            </a:r>
+            <a:endParaRPr lang="en-IN" dirty="0"/>
+          </a:p>
+        </p:txBody>
+      </p:sp>
+      <p:sp>
+        <p:nvSpPr>
+          <p:cNvPr id="3" name="Content Placeholder 2"/>
+          <p:cNvSpPr>
+            <a:spLocks noGrp="1"/>
+          </p:cNvSpPr>
+          <p:nvPr>
+            <p:ph idx="1"/>
+          </p:nvPr>
+        </p:nvSpPr>
+        <p:spPr>
+          <a:xfrm>
+            <a:off x="838200" y="2292439"/>
+            <a:ext cx="10515600" cy="3884524"/>
+          </a:xfrm>
+        </p:spPr>
+        <p:txBody>
+          <a:bodyPr>
+            <a:normAutofit/>
+          </a:bodyPr>
+          <a:lstStyle/>
+          <a:p>
+            <a:r>
+              <a:rPr lang="en-IN" sz="2000" dirty="0" smtClean="0"/>
+              <a:t>The data available over the internet now is huge. More Data, more information.</a:t>
+            </a:r>
+          </a:p>
+          <a:p>
+            <a:pPr marL="0" indent="0">
+              <a:buNone/>
+            </a:pPr>
+            <a:endParaRPr lang="en-IN" sz="2000" dirty="0" smtClean="0"/>
+          </a:p>
+          <a:p>
+            <a:r>
+              <a:rPr lang="en-IN" sz="2000" dirty="0" smtClean="0"/>
+              <a:t>A Python web scraping code (called as the spider code) can be built based on the webpage’s skeleton to extract the content from the respective website.</a:t>
+            </a:r>
+          </a:p>
+          <a:p>
+            <a:pPr marL="0" indent="0">
+              <a:buNone/>
+            </a:pPr>
+            <a:endParaRPr lang="en-IN" sz="2000" dirty="0" smtClean="0"/>
+          </a:p>
+          <a:p>
+            <a:r>
+              <a:rPr lang="en-IN" sz="2000" dirty="0" smtClean="0"/>
+              <a:t>We have developed such a sample spider code for the following site: </a:t>
+            </a:r>
+            <a:r>
+              <a:rPr lang="en-IN" sz="2000" dirty="0" smtClean="0">
+                <a:hlinkClick r:id="rId2"/>
+              </a:rPr>
+              <a:t>www.checkatrade.com</a:t>
+            </a:r>
+            <a:endParaRPr lang="en-IN" sz="2000" dirty="0" smtClean="0"/>
+          </a:p>
+          <a:p>
+            <a:pPr marL="0" indent="0">
+              <a:buNone/>
+            </a:pPr>
+            <a:endParaRPr lang="en-IN" sz="2000" dirty="0" smtClean="0"/>
+          </a:p>
+          <a:p>
+            <a:r>
+              <a:rPr lang="en-IN" sz="2000" dirty="0" smtClean="0"/>
+              <a:t>This site contains all the useful information about the various builders available across the UK, along with the services they provide.</a:t>
+            </a:r>
+          </a:p>
+          <a:p>
+            <a:endParaRPr lang="en-IN" sz="2000" dirty="0"/>
+          </a:p>
+        </p:txBody>
+      </p:sp>
+    </p:spTree>
+    <p:extLst>
+      <p:ext uri="{BB962C8B-B14F-4D97-AF65-F5344CB8AC3E}">
+        <p14:creationId xmlns:p14="http://schemas.microsoft.com/office/powerpoint/2010/main" val="217253897"/>
+      </p:ext>
+    </p:extLst>
+  </p:cSld>
+  <p:clrMapOvr>
+    <a:masterClrMapping/>
+  </p:clrMapOvr>
+</p:sld>
+</file>
+
 <file path=ppt/slides/slide6.xml><?xml version="1.0" encoding="utf-8"?>
 <p:sld xmlns:a="http://schemas.openxmlformats.org/drawingml/2006/main" xmlns:r="http://schemas.openxmlformats.org/officeDocument/2006/relationships" xmlns:p="http://schemas.openxmlformats.org/presentationml/2006/main">
   <p:cSld>
@@ -4742,134 +5344,453 @@
           <a:chExt cx="0" cy="0"/>
         </a:xfrm>
       </p:grpSpPr>
-      <p:sp>
-        <p:nvSpPr>
-          <p:cNvPr id="2" name="Title 1"/>
-          <p:cNvSpPr>
-            <a:spLocks noGrp="1"/>
-          </p:cNvSpPr>
-          <p:nvPr>
-            <p:ph type="title"/>
-          </p:nvPr>
-        </p:nvSpPr>
-        <p:spPr/>
-        <p:txBody>
-          <a:bodyPr/>
-          <a:lstStyle/>
-          <a:p>
-            <a:r>
-              <a:rPr lang="en-IN" dirty="0" smtClean="0"/>
-              <a:t>Data Science - Introduction</a:t>
-            </a:r>
-            <a:endParaRPr lang="en-IN" dirty="0"/>
-          </a:p>
-        </p:txBody>
-      </p:sp>
-      <p:sp>
-        <p:nvSpPr>
-          <p:cNvPr id="3" name="Content Placeholder 2"/>
-          <p:cNvSpPr>
-            <a:spLocks noGrp="1"/>
-          </p:cNvSpPr>
-          <p:nvPr>
-            <p:ph idx="1"/>
-          </p:nvPr>
-        </p:nvSpPr>
-        <p:spPr>
-          <a:xfrm>
-            <a:off x="838200" y="1825625"/>
-            <a:ext cx="8614893" cy="4351338"/>
-          </a:xfrm>
-        </p:spPr>
-        <p:txBody>
-          <a:bodyPr/>
-          <a:lstStyle/>
-          <a:p>
-            <a:r>
-              <a:rPr lang="en-IN" dirty="0" err="1" smtClean="0"/>
-              <a:t>NumPy</a:t>
-            </a:r>
-            <a:r>
-              <a:rPr lang="en-IN" dirty="0" smtClean="0"/>
-              <a:t> – Numeric Python</a:t>
-            </a:r>
-          </a:p>
-          <a:p>
-            <a:endParaRPr lang="en-IN" dirty="0"/>
-          </a:p>
-          <a:p>
-            <a:r>
-              <a:rPr lang="en-IN" dirty="0" smtClean="0"/>
-              <a:t>Why </a:t>
-            </a:r>
-            <a:r>
-              <a:rPr lang="en-IN" dirty="0" err="1" smtClean="0"/>
-              <a:t>NumPy</a:t>
-            </a:r>
-            <a:r>
-              <a:rPr lang="en-IN" dirty="0" smtClean="0"/>
-              <a:t> when you have lists ?</a:t>
-            </a:r>
-          </a:p>
-          <a:p>
-            <a:endParaRPr lang="en-IN" dirty="0"/>
-          </a:p>
-          <a:p>
-            <a:r>
-              <a:rPr lang="en-IN" dirty="0" smtClean="0"/>
-              <a:t>Details Analysis</a:t>
-            </a:r>
-          </a:p>
-          <a:p>
-            <a:endParaRPr lang="en-IN" dirty="0"/>
-          </a:p>
-          <a:p>
-            <a:r>
-              <a:rPr lang="en-IN" dirty="0" smtClean="0"/>
-              <a:t>Datasets for </a:t>
-            </a:r>
-            <a:r>
-              <a:rPr lang="en-IN" dirty="0" err="1" smtClean="0"/>
-              <a:t>Numpy</a:t>
-            </a:r>
-            <a:endParaRPr lang="en-IN" dirty="0"/>
-          </a:p>
-        </p:txBody>
-      </p:sp>
       <p:pic>
         <p:nvPicPr>
-          <p:cNvPr id="4" name="Picture 3"/>
+          <p:cNvPr id="6" name="Picture 5"/>
           <p:cNvPicPr>
             <a:picLocks noChangeAspect="1"/>
           </p:cNvPicPr>
           <p:nvPr/>
         </p:nvPicPr>
-        <p:blipFill>
-          <a:blip r:embed="rId2">
-            <a:extLst>
-              <a:ext uri="{28A0092B-C50C-407E-A947-70E740481C1C}">
-                <a14:useLocalDpi xmlns:a14="http://schemas.microsoft.com/office/drawing/2010/main" val="0"/>
-              </a:ext>
-            </a:extLst>
-          </a:blip>
-          <a:stretch>
-            <a:fillRect/>
-          </a:stretch>
+        <p:blipFill rotWithShape="1">
+          <a:blip r:embed="rId2"/>
+          <a:srcRect r="959" b="8097"/>
+          <a:stretch/>
         </p:blipFill>
         <p:spPr>
           <a:xfrm>
-            <a:off x="6593982" y="1690688"/>
-            <a:ext cx="5407517" cy="4117684"/>
+            <a:off x="1622738" y="0"/>
+            <a:ext cx="9427336" cy="4159876"/>
           </a:xfrm>
           <a:prstGeom prst="rect">
             <a:avLst/>
           </a:prstGeom>
         </p:spPr>
       </p:pic>
+      <p:sp>
+        <p:nvSpPr>
+          <p:cNvPr id="3" name="Subtitle 2"/>
+          <p:cNvSpPr>
+            <a:spLocks noGrp="1"/>
+          </p:cNvSpPr>
+          <p:nvPr>
+            <p:ph type="subTitle" idx="1"/>
+          </p:nvPr>
+        </p:nvSpPr>
+        <p:spPr>
+          <a:xfrm>
+            <a:off x="682580" y="399246"/>
+            <a:ext cx="10676586" cy="6040192"/>
+          </a:xfrm>
+        </p:spPr>
+        <p:txBody>
+          <a:bodyPr/>
+          <a:lstStyle/>
+          <a:p>
+            <a:r>
+              <a:rPr lang="en-IN" dirty="0" smtClean="0"/>
+              <a:t>            </a:t>
+            </a:r>
+            <a:endParaRPr lang="en-IN" dirty="0"/>
+          </a:p>
+        </p:txBody>
+      </p:sp>
+      <p:sp>
+        <p:nvSpPr>
+          <p:cNvPr id="7" name="TextBox 6"/>
+          <p:cNvSpPr txBox="1"/>
+          <p:nvPr/>
+        </p:nvSpPr>
+        <p:spPr>
+          <a:xfrm>
+            <a:off x="1931831" y="4559121"/>
+            <a:ext cx="9427335" cy="1477328"/>
+          </a:xfrm>
+          <a:prstGeom prst="rect">
+            <a:avLst/>
+          </a:prstGeom>
+          <a:noFill/>
+        </p:spPr>
+        <p:txBody>
+          <a:bodyPr wrap="square" rtlCol="0">
+            <a:spAutoFit/>
+          </a:bodyPr>
+          <a:lstStyle/>
+          <a:p>
+            <a:r>
+              <a:rPr lang="en-IN" dirty="0" smtClean="0"/>
+              <a:t>This is the sample site we chose, to pull the content from.</a:t>
+            </a:r>
+          </a:p>
+          <a:p>
+            <a:endParaRPr lang="en-IN" dirty="0" smtClean="0"/>
+          </a:p>
+          <a:p>
+            <a:r>
+              <a:rPr lang="en-IN" dirty="0" smtClean="0"/>
+              <a:t>Note: There were over 2000 records under each alphabet, so this site has around 2000 * 26 = 52000 companies details.</a:t>
+            </a:r>
+          </a:p>
+          <a:p>
+            <a:endParaRPr lang="en-IN" dirty="0"/>
+          </a:p>
+        </p:txBody>
+      </p:sp>
     </p:spTree>
     <p:extLst>
       <p:ext uri="{BB962C8B-B14F-4D97-AF65-F5344CB8AC3E}">
-        <p14:creationId xmlns:p14="http://schemas.microsoft.com/office/powerpoint/2010/main" val="1847141217"/>
+        <p14:creationId xmlns:p14="http://schemas.microsoft.com/office/powerpoint/2010/main" val="588241505"/>
+      </p:ext>
+    </p:extLst>
+  </p:cSld>
+  <p:clrMapOvr>
+    <a:masterClrMapping/>
+  </p:clrMapOvr>
+</p:sld>
+</file>
+
+<file path=ppt/slides/slide7.xml><?xml version="1.0" encoding="utf-8"?>
+<p:sld xmlns:a="http://schemas.openxmlformats.org/drawingml/2006/main" xmlns:r="http://schemas.openxmlformats.org/officeDocument/2006/relationships" xmlns:p="http://schemas.openxmlformats.org/presentationml/2006/main">
+  <p:cSld>
+    <p:spTree>
+      <p:nvGrpSpPr>
+        <p:cNvPr id="1" name=""/>
+        <p:cNvGrpSpPr/>
+        <p:nvPr/>
+      </p:nvGrpSpPr>
+      <p:grpSpPr>
+        <a:xfrm>
+          <a:off x="0" y="0"/>
+          <a:ext cx="0" cy="0"/>
+          <a:chOff x="0" y="0"/>
+          <a:chExt cx="0" cy="0"/>
+        </a:xfrm>
+      </p:grpSpPr>
+      <p:pic>
+        <p:nvPicPr>
+          <p:cNvPr id="6" name="Content Placeholder 3"/>
+          <p:cNvPicPr>
+            <a:picLocks noGrp="1" noChangeAspect="1"/>
+          </p:cNvPicPr>
+          <p:nvPr>
+            <p:ph idx="1"/>
+          </p:nvPr>
+        </p:nvPicPr>
+        <p:blipFill rotWithShape="1">
+          <a:blip r:embed="rId2"/>
+          <a:srcRect l="354" t="12010" r="12101" b="31048"/>
+          <a:stretch/>
+        </p:blipFill>
+        <p:spPr>
+          <a:xfrm>
+            <a:off x="567745" y="352805"/>
+            <a:ext cx="10515600" cy="3845439"/>
+          </a:xfrm>
+          <a:prstGeom prst="rect">
+            <a:avLst/>
+          </a:prstGeom>
+        </p:spPr>
+      </p:pic>
+      <p:sp>
+        <p:nvSpPr>
+          <p:cNvPr id="7" name="TextBox 6"/>
+          <p:cNvSpPr txBox="1"/>
+          <p:nvPr/>
+        </p:nvSpPr>
+        <p:spPr>
+          <a:xfrm>
+            <a:off x="695459" y="4649273"/>
+            <a:ext cx="10547797" cy="923330"/>
+          </a:xfrm>
+          <a:prstGeom prst="rect">
+            <a:avLst/>
+          </a:prstGeom>
+          <a:noFill/>
+        </p:spPr>
+        <p:txBody>
+          <a:bodyPr wrap="square" rtlCol="0">
+            <a:spAutoFit/>
+          </a:bodyPr>
+          <a:lstStyle/>
+          <a:p>
+            <a:r>
+              <a:rPr lang="en-IN" dirty="0" smtClean="0"/>
+              <a:t>We captured the required elements from the website using </a:t>
+            </a:r>
+            <a:r>
+              <a:rPr lang="en-IN" dirty="0" err="1" smtClean="0"/>
+              <a:t>Xpath</a:t>
+            </a:r>
+            <a:r>
+              <a:rPr lang="en-IN" dirty="0" smtClean="0"/>
+              <a:t> selector, and also wrote a crawler code, which crawls after completing one page to another, till it reaches the last page.</a:t>
+            </a:r>
+          </a:p>
+          <a:p>
+            <a:endParaRPr lang="en-IN" dirty="0"/>
+          </a:p>
+        </p:txBody>
+      </p:sp>
+    </p:spTree>
+    <p:extLst>
+      <p:ext uri="{BB962C8B-B14F-4D97-AF65-F5344CB8AC3E}">
+        <p14:creationId xmlns:p14="http://schemas.microsoft.com/office/powerpoint/2010/main" val="1161464253"/>
+      </p:ext>
+    </p:extLst>
+  </p:cSld>
+  <p:clrMapOvr>
+    <a:masterClrMapping/>
+  </p:clrMapOvr>
+</p:sld>
+</file>
+
+<file path=ppt/slides/slide8.xml><?xml version="1.0" encoding="utf-8"?>
+<p:sld xmlns:a="http://schemas.openxmlformats.org/drawingml/2006/main" xmlns:r="http://schemas.openxmlformats.org/officeDocument/2006/relationships" xmlns:p="http://schemas.openxmlformats.org/presentationml/2006/main">
+  <p:cSld>
+    <p:spTree>
+      <p:nvGrpSpPr>
+        <p:cNvPr id="1" name=""/>
+        <p:cNvGrpSpPr/>
+        <p:nvPr/>
+      </p:nvGrpSpPr>
+      <p:grpSpPr>
+        <a:xfrm>
+          <a:off x="0" y="0"/>
+          <a:ext cx="0" cy="0"/>
+          <a:chOff x="0" y="0"/>
+          <a:chExt cx="0" cy="0"/>
+        </a:xfrm>
+      </p:grpSpPr>
+      <p:sp>
+        <p:nvSpPr>
+          <p:cNvPr id="3" name="Subtitle 2"/>
+          <p:cNvSpPr>
+            <a:spLocks noGrp="1"/>
+          </p:cNvSpPr>
+          <p:nvPr>
+            <p:ph type="subTitle" idx="1"/>
+          </p:nvPr>
+        </p:nvSpPr>
+        <p:spPr>
+          <a:xfrm>
+            <a:off x="734095" y="425004"/>
+            <a:ext cx="10998558" cy="2884866"/>
+          </a:xfrm>
+        </p:spPr>
+        <p:txBody>
+          <a:bodyPr/>
+          <a:lstStyle/>
+          <a:p>
+            <a:endParaRPr lang="en-IN" dirty="0" smtClean="0"/>
+          </a:p>
+          <a:p>
+            <a:endParaRPr lang="en-IN" dirty="0"/>
+          </a:p>
+          <a:p>
+            <a:endParaRPr lang="en-IN" dirty="0" smtClean="0"/>
+          </a:p>
+          <a:p>
+            <a:endParaRPr lang="en-IN" dirty="0"/>
+          </a:p>
+          <a:p>
+            <a:endParaRPr lang="en-IN" dirty="0" smtClean="0"/>
+          </a:p>
+          <a:p>
+            <a:endParaRPr lang="en-IN" dirty="0"/>
+          </a:p>
+          <a:p>
+            <a:endParaRPr lang="en-IN" dirty="0" smtClean="0"/>
+          </a:p>
+          <a:p>
+            <a:endParaRPr lang="en-IN" dirty="0" smtClean="0"/>
+          </a:p>
+        </p:txBody>
+      </p:sp>
+      <p:pic>
+        <p:nvPicPr>
+          <p:cNvPr id="5" name="Picture 4"/>
+          <p:cNvPicPr>
+            <a:picLocks noChangeAspect="1"/>
+          </p:cNvPicPr>
+          <p:nvPr/>
+        </p:nvPicPr>
+        <p:blipFill rotWithShape="1">
+          <a:blip r:embed="rId2"/>
+          <a:srcRect t="25849" r="9281" b="18538"/>
+          <a:stretch/>
+        </p:blipFill>
+        <p:spPr>
+          <a:xfrm>
+            <a:off x="734095" y="425003"/>
+            <a:ext cx="9131122" cy="3271233"/>
+          </a:xfrm>
+          <a:prstGeom prst="rect">
+            <a:avLst/>
+          </a:prstGeom>
+        </p:spPr>
+      </p:pic>
+      <p:sp>
+        <p:nvSpPr>
+          <p:cNvPr id="7" name="TextBox 6"/>
+          <p:cNvSpPr txBox="1"/>
+          <p:nvPr/>
+        </p:nvSpPr>
+        <p:spPr>
+          <a:xfrm>
+            <a:off x="734095" y="4185634"/>
+            <a:ext cx="10328857" cy="1754326"/>
+          </a:xfrm>
+          <a:prstGeom prst="rect">
+            <a:avLst/>
+          </a:prstGeom>
+          <a:noFill/>
+        </p:spPr>
+        <p:txBody>
+          <a:bodyPr wrap="square" rtlCol="0">
+            <a:spAutoFit/>
+          </a:bodyPr>
+          <a:lstStyle/>
+          <a:p>
+            <a:endParaRPr lang="en-IN" dirty="0" smtClean="0"/>
+          </a:p>
+          <a:p>
+            <a:endParaRPr lang="en-IN" dirty="0"/>
+          </a:p>
+          <a:p>
+            <a:endParaRPr lang="en-IN" dirty="0" smtClean="0"/>
+          </a:p>
+          <a:p>
+            <a:r>
+              <a:rPr lang="en-IN" dirty="0" smtClean="0"/>
+              <a:t>The final output of the spider code will be a </a:t>
+            </a:r>
+            <a:r>
+              <a:rPr lang="en-IN" dirty="0" err="1" smtClean="0"/>
+              <a:t>csv</a:t>
+            </a:r>
+            <a:r>
+              <a:rPr lang="en-IN" dirty="0" smtClean="0"/>
+              <a:t> file [ note : can be a </a:t>
+            </a:r>
+            <a:r>
+              <a:rPr lang="en-IN" dirty="0" err="1" smtClean="0"/>
+              <a:t>json</a:t>
+            </a:r>
+            <a:r>
+              <a:rPr lang="en-IN" dirty="0" smtClean="0"/>
+              <a:t> file if required], with the data as shown in the table.</a:t>
+            </a:r>
+          </a:p>
+          <a:p>
+            <a:endParaRPr lang="en-IN" dirty="0"/>
+          </a:p>
+        </p:txBody>
+      </p:sp>
+    </p:spTree>
+    <p:extLst>
+      <p:ext uri="{BB962C8B-B14F-4D97-AF65-F5344CB8AC3E}">
+        <p14:creationId xmlns:p14="http://schemas.microsoft.com/office/powerpoint/2010/main" val="469342467"/>
+      </p:ext>
+    </p:extLst>
+  </p:cSld>
+  <p:clrMapOvr>
+    <a:masterClrMapping/>
+  </p:clrMapOvr>
+</p:sld>
+</file>
+
+<file path=ppt/slides/slide9.xml><?xml version="1.0" encoding="utf-8"?>
+<p:sld xmlns:a="http://schemas.openxmlformats.org/drawingml/2006/main" xmlns:r="http://schemas.openxmlformats.org/officeDocument/2006/relationships" xmlns:p="http://schemas.openxmlformats.org/presentationml/2006/main">
+  <p:cSld>
+    <p:spTree>
+      <p:nvGrpSpPr>
+        <p:cNvPr id="1" name=""/>
+        <p:cNvGrpSpPr/>
+        <p:nvPr/>
+      </p:nvGrpSpPr>
+      <p:grpSpPr>
+        <a:xfrm>
+          <a:off x="0" y="0"/>
+          <a:ext cx="0" cy="0"/>
+          <a:chOff x="0" y="0"/>
+          <a:chExt cx="0" cy="0"/>
+        </a:xfrm>
+      </p:grpSpPr>
+      <p:sp>
+        <p:nvSpPr>
+          <p:cNvPr id="4" name="TextBox 3"/>
+          <p:cNvSpPr txBox="1"/>
+          <p:nvPr/>
+        </p:nvSpPr>
+        <p:spPr>
+          <a:xfrm>
+            <a:off x="244699" y="399245"/>
+            <a:ext cx="11384924" cy="1477328"/>
+          </a:xfrm>
+          <a:prstGeom prst="rect">
+            <a:avLst/>
+          </a:prstGeom>
+          <a:noFill/>
+        </p:spPr>
+        <p:txBody>
+          <a:bodyPr wrap="square" rtlCol="0">
+            <a:spAutoFit/>
+          </a:bodyPr>
+          <a:lstStyle/>
+          <a:p>
+            <a:r>
+              <a:rPr lang="en-IN" dirty="0" smtClean="0"/>
+              <a:t>The data obtained from such websites can be used in many ways.</a:t>
+            </a:r>
+          </a:p>
+          <a:p>
+            <a:endParaRPr lang="en-IN" dirty="0" smtClean="0"/>
+          </a:p>
+          <a:p>
+            <a:r>
+              <a:rPr lang="en-IN" dirty="0" smtClean="0"/>
+              <a:t>The following output file can be used to feed into another system for processing and filtering various companies which can do the respective work and has a good review.</a:t>
+            </a:r>
+          </a:p>
+          <a:p>
+            <a:endParaRPr lang="en-IN" dirty="0"/>
+          </a:p>
+        </p:txBody>
+      </p:sp>
+      <p:sp>
+        <p:nvSpPr>
+          <p:cNvPr id="6" name="TextBox 5"/>
+          <p:cNvSpPr txBox="1"/>
+          <p:nvPr/>
+        </p:nvSpPr>
+        <p:spPr>
+          <a:xfrm>
+            <a:off x="360608" y="2408349"/>
+            <a:ext cx="11269015" cy="646331"/>
+          </a:xfrm>
+          <a:prstGeom prst="rect">
+            <a:avLst/>
+          </a:prstGeom>
+          <a:noFill/>
+        </p:spPr>
+        <p:txBody>
+          <a:bodyPr wrap="square" rtlCol="0">
+            <a:spAutoFit/>
+          </a:bodyPr>
+          <a:lstStyle/>
+          <a:p>
+            <a:r>
+              <a:rPr lang="en-IN" dirty="0" smtClean="0"/>
+              <a:t>NOTE : As shown for this sample site, the following can be done for many websites which contain much more important information and be processed in an effective way.</a:t>
+            </a:r>
+            <a:endParaRPr lang="en-IN" dirty="0"/>
+          </a:p>
+        </p:txBody>
+      </p:sp>
+    </p:spTree>
+    <p:extLst>
+      <p:ext uri="{BB962C8B-B14F-4D97-AF65-F5344CB8AC3E}">
+        <p14:creationId xmlns:p14="http://schemas.microsoft.com/office/powerpoint/2010/main" val="640280662"/>
       </p:ext>
     </p:extLst>
   </p:cSld>

</xml_diff>